<commit_message>
Added disease life table inputs
Added variables Healthy, Disease and Dead
</commit_message>
<xml_diff>
--- a/structure/PMSLTframeworkV2.pptx
+++ b/structure/PMSLTframeworkV2.pptx
@@ -213,7 +213,7 @@
           <a:p>
             <a:fld id="{B8A87EDB-1A2C-4B2E-83A8-5842A14D9950}" type="datetimeFigureOut">
               <a:rPr lang="en-GB" smtClean="0"/>
-              <a:t>07/02/2018</a:t>
+              <a:t>12/02/2018</a:t>
             </a:fld>
             <a:endParaRPr lang="en-GB"/>
           </a:p>
@@ -2101,7 +2101,7 @@
           <a:p>
             <a:fld id="{DEF44FD3-4A6B-46FF-925D-7C09BFC1FBE9}" type="datetimeFigureOut">
               <a:rPr lang="en-GB" smtClean="0"/>
-              <a:t>07/02/2018</a:t>
+              <a:t>12/02/2018</a:t>
             </a:fld>
             <a:endParaRPr lang="en-GB"/>
           </a:p>
@@ -2271,7 +2271,7 @@
           <a:p>
             <a:fld id="{DEF44FD3-4A6B-46FF-925D-7C09BFC1FBE9}" type="datetimeFigureOut">
               <a:rPr lang="en-GB" smtClean="0"/>
-              <a:t>07/02/2018</a:t>
+              <a:t>12/02/2018</a:t>
             </a:fld>
             <a:endParaRPr lang="en-GB"/>
           </a:p>
@@ -2451,7 +2451,7 @@
           <a:p>
             <a:fld id="{DEF44FD3-4A6B-46FF-925D-7C09BFC1FBE9}" type="datetimeFigureOut">
               <a:rPr lang="en-GB" smtClean="0"/>
-              <a:t>07/02/2018</a:t>
+              <a:t>12/02/2018</a:t>
             </a:fld>
             <a:endParaRPr lang="en-GB"/>
           </a:p>
@@ -2621,7 +2621,7 @@
           <a:p>
             <a:fld id="{DEF44FD3-4A6B-46FF-925D-7C09BFC1FBE9}" type="datetimeFigureOut">
               <a:rPr lang="en-GB" smtClean="0"/>
-              <a:t>07/02/2018</a:t>
+              <a:t>12/02/2018</a:t>
             </a:fld>
             <a:endParaRPr lang="en-GB"/>
           </a:p>
@@ -2867,7 +2867,7 @@
           <a:p>
             <a:fld id="{DEF44FD3-4A6B-46FF-925D-7C09BFC1FBE9}" type="datetimeFigureOut">
               <a:rPr lang="en-GB" smtClean="0"/>
-              <a:t>07/02/2018</a:t>
+              <a:t>12/02/2018</a:t>
             </a:fld>
             <a:endParaRPr lang="en-GB"/>
           </a:p>
@@ -3099,7 +3099,7 @@
           <a:p>
             <a:fld id="{DEF44FD3-4A6B-46FF-925D-7C09BFC1FBE9}" type="datetimeFigureOut">
               <a:rPr lang="en-GB" smtClean="0"/>
-              <a:t>07/02/2018</a:t>
+              <a:t>12/02/2018</a:t>
             </a:fld>
             <a:endParaRPr lang="en-GB"/>
           </a:p>
@@ -3466,7 +3466,7 @@
           <a:p>
             <a:fld id="{DEF44FD3-4A6B-46FF-925D-7C09BFC1FBE9}" type="datetimeFigureOut">
               <a:rPr lang="en-GB" smtClean="0"/>
-              <a:t>07/02/2018</a:t>
+              <a:t>12/02/2018</a:t>
             </a:fld>
             <a:endParaRPr lang="en-GB"/>
           </a:p>
@@ -3584,7 +3584,7 @@
           <a:p>
             <a:fld id="{DEF44FD3-4A6B-46FF-925D-7C09BFC1FBE9}" type="datetimeFigureOut">
               <a:rPr lang="en-GB" smtClean="0"/>
-              <a:t>07/02/2018</a:t>
+              <a:t>12/02/2018</a:t>
             </a:fld>
             <a:endParaRPr lang="en-GB"/>
           </a:p>
@@ -3679,7 +3679,7 @@
           <a:p>
             <a:fld id="{DEF44FD3-4A6B-46FF-925D-7C09BFC1FBE9}" type="datetimeFigureOut">
               <a:rPr lang="en-GB" smtClean="0"/>
-              <a:t>07/02/2018</a:t>
+              <a:t>12/02/2018</a:t>
             </a:fld>
             <a:endParaRPr lang="en-GB"/>
           </a:p>
@@ -3956,7 +3956,7 @@
           <a:p>
             <a:fld id="{DEF44FD3-4A6B-46FF-925D-7C09BFC1FBE9}" type="datetimeFigureOut">
               <a:rPr lang="en-GB" smtClean="0"/>
-              <a:t>07/02/2018</a:t>
+              <a:t>12/02/2018</a:t>
             </a:fld>
             <a:endParaRPr lang="en-GB"/>
           </a:p>
@@ -4209,7 +4209,7 @@
           <a:p>
             <a:fld id="{DEF44FD3-4A6B-46FF-925D-7C09BFC1FBE9}" type="datetimeFigureOut">
               <a:rPr lang="en-GB" smtClean="0"/>
-              <a:t>07/02/2018</a:t>
+              <a:t>12/02/2018</a:t>
             </a:fld>
             <a:endParaRPr lang="en-GB"/>
           </a:p>
@@ -4422,7 +4422,7 @@
           <a:p>
             <a:fld id="{DEF44FD3-4A6B-46FF-925D-7C09BFC1FBE9}" type="datetimeFigureOut">
               <a:rPr lang="en-GB" smtClean="0"/>
-              <a:t>07/02/2018</a:t>
+              <a:t>12/02/2018</a:t>
             </a:fld>
             <a:endParaRPr lang="en-GB"/>
           </a:p>
@@ -5184,13 +5184,8 @@
             </a:pPr>
             <a:r>
               <a:rPr lang="en-GB" sz="2000" dirty="0" smtClean="0"/>
-              <a:t>OTHERS: HOW ARE THE CALCULATIONS COMING TOGETHER? CREATION OF TWO MODELS, ONE AS IS AND THE OTHER WITHOUT </a:t>
-            </a:r>
-            <a:r>
-              <a:rPr lang="en-GB" sz="2000" dirty="0" smtClean="0"/>
-              <a:t>INTERVENTION?</a:t>
-            </a:r>
-            <a:endParaRPr lang="en-GB" sz="2000" dirty="0" smtClean="0"/>
+              <a:t>OTHERS: HOW ARE THE CALCULATIONS COMING TOGETHER? CREATION OF TWO MODELS, ONE AS IS AND THE OTHER WITHOUT INTERVENTION?</a:t>
+            </a:r>
           </a:p>
           <a:p>
             <a:pPr marL="342900" indent="-342900">
@@ -5483,23 +5478,7 @@
                   <a:srgbClr val="FF0000"/>
                 </a:solidFill>
               </a:rPr>
-              <a:t>For now (example </a:t>
-            </a:r>
-            <a:r>
-              <a:rPr lang="en-GB" sz="2000" b="1" dirty="0" smtClean="0">
-                <a:solidFill>
-                  <a:srgbClr val="FF0000"/>
-                </a:solidFill>
-              </a:rPr>
-              <a:t>England/Australia), </a:t>
-            </a:r>
-            <a:r>
-              <a:rPr lang="en-GB" sz="2000" b="1" dirty="0" smtClean="0">
-                <a:solidFill>
-                  <a:srgbClr val="FF0000"/>
-                </a:solidFill>
-              </a:rPr>
-              <a:t>ready to use. Discussion of inputs and best approach for data standardisation. </a:t>
+              <a:t>For now (example England/Australia), ready to use. Discussion of inputs and best approach for data standardisation. </a:t>
             </a:r>
           </a:p>
           <a:p>
@@ -14116,8 +14095,8 @@
           </a:p>
         </p:txBody>
       </p:sp>
-      <mc:AlternateContent xmlns:mc="http://schemas.openxmlformats.org/markup-compatibility/2006" xmlns:a14="http://schemas.microsoft.com/office/drawing/2010/main">
-        <mc:Choice Requires="a14">
+      <mc:AlternateContent xmlns:mc="http://schemas.openxmlformats.org/markup-compatibility/2006">
+        <mc:Choice xmlns:a14="http://schemas.microsoft.com/office/drawing/2010/main" Requires="a14">
           <p:sp>
             <p:nvSpPr>
               <p:cNvPr id="17" name="Rectangle 16"/>
@@ -14149,7 +14128,7 @@
                       <m:sSub>
                         <m:sSubPr>
                           <m:ctrlPr>
-                            <a:rPr lang="en-GB" sz="1400" i="1">
+                            <a:rPr lang="en-GB" sz="1400" i="1" smtClean="0">
                               <a:latin typeface="Cambria Math" panose="02040503050406030204" pitchFamily="18" charset="0"/>
                             </a:rPr>
                           </m:ctrlPr>
@@ -14186,6 +14165,12 @@
                           </m:ctrlPr>
                         </m:fPr>
                         <m:num>
+                          <m:r>
+                            <a:rPr lang="en-GB" sz="1400" b="0" i="1" smtClean="0">
+                              <a:latin typeface="Cambria Math" panose="02040503050406030204" pitchFamily="18" charset="0"/>
+                            </a:rPr>
+                            <m:t>(</m:t>
+                          </m:r>
                           <m:r>
                             <a:rPr lang="en-GB" sz="1400" i="0">
                               <a:latin typeface="Cambria Math" panose="02040503050406030204" pitchFamily="18" charset="0"/>
@@ -14708,6 +14693,12 @@
                               </m:d>
                             </m:e>
                           </m:d>
+                          <m:r>
+                            <a:rPr lang="en-GB" sz="1400" b="0" i="1" smtClean="0">
+                              <a:latin typeface="Cambria Math" panose="02040503050406030204" pitchFamily="18" charset="0"/>
+                            </a:rPr>
+                            <m:t>)</m:t>
+                          </m:r>
                         </m:num>
                         <m:den>
                           <m:r>
@@ -14715,6 +14706,12 @@
                               <a:latin typeface="Cambria Math" panose="02040503050406030204" pitchFamily="18" charset="0"/>
                             </a:rPr>
                             <m:t>2</m:t>
+                          </m:r>
+                          <m:r>
+                            <a:rPr lang="en-GB" sz="1400" b="0" i="0" smtClean="0">
+                              <a:latin typeface="Cambria Math" panose="02040503050406030204" pitchFamily="18" charset="0"/>
+                            </a:rPr>
+                            <m:t>∗</m:t>
                           </m:r>
                           <m:sSub>
                             <m:sSubPr>
@@ -14751,7 +14748,7 @@
             </p:txBody>
           </p:sp>
         </mc:Choice>
-        <mc:Fallback xmlns="">
+        <mc:Fallback>
           <p:sp>
             <p:nvSpPr>
               <p:cNvPr id="17" name="Rectangle 16"/>

</xml_diff>